<commit_message>
added latest slides on NN training
</commit_message>
<xml_diff>
--- a/EELS_KK/Slides/spectral_image class.pptx
+++ b/EELS_KK/Slides/spectral_image class.pptx
@@ -19,6 +19,7 @@
     <p:sldId id="267" r:id="rId13"/>
     <p:sldId id="268" r:id="rId14"/>
     <p:sldId id="269" r:id="rId15"/>
+    <p:sldId id="270" r:id="rId16"/>
   </p:sldIdLst>
   <p:sldSz cx="12192000" cy="6858000"/>
   <p:notesSz cx="6858000" cy="9144000"/>
@@ -3996,19 +3997,7 @@
               <a:rPr lang="nl-NL" dirty="0" err="1">
                 <a:latin typeface="Monaco" pitchFamily="2" charset="77"/>
               </a:rPr>
-              <a:t>im.crossings</a:t>
-            </a:r>
-            <a:r>
-              <a:rPr lang="nl-NL" dirty="0">
-                <a:latin typeface="Monaco" pitchFamily="2" charset="77"/>
-              </a:rPr>
-              <a:t> </a:t>
-            </a:r>
-            <a:r>
-              <a:rPr lang="nl-NL" dirty="0" err="1">
-                <a:latin typeface="Monaco" pitchFamily="2" charset="77"/>
-              </a:rPr>
-              <a:t>im</a:t>
+              <a:t>im.crossings_im</a:t>
             </a:r>
             <a:r>
               <a:rPr lang="nl-NL" dirty="0">
@@ -4546,6 +4535,424 @@
                                         </p:cTn>
                                         <p:tgtEl>
                                           <p:spTgt spid="13"/>
+                                        </p:tgtEl>
+                                        <p:attrNameLst>
+                                          <p:attrName>style.visibility</p:attrName>
+                                        </p:attrNameLst>
+                                      </p:cBhvr>
+                                      <p:to>
+                                        <p:strVal val="visible"/>
+                                      </p:to>
+                                    </p:set>
+                                  </p:childTnLst>
+                                </p:cTn>
+                              </p:par>
+                            </p:childTnLst>
+                          </p:cTn>
+                        </p:par>
+                      </p:childTnLst>
+                    </p:cTn>
+                  </p:par>
+                </p:childTnLst>
+              </p:cTn>
+              <p:prevCondLst>
+                <p:cond evt="onPrev" delay="0">
+                  <p:tgtEl>
+                    <p:sldTgt/>
+                  </p:tgtEl>
+                </p:cond>
+              </p:prevCondLst>
+              <p:nextCondLst>
+                <p:cond evt="onNext" delay="0">
+                  <p:tgtEl>
+                    <p:sldTgt/>
+                  </p:tgtEl>
+                </p:cond>
+              </p:nextCondLst>
+            </p:seq>
+          </p:childTnLst>
+        </p:cTn>
+      </p:par>
+    </p:tnLst>
+  </p:timing>
+</p:sld>
+</file>
+
+<file path=ppt/slides/slide15.xml><?xml version="1.0" encoding="utf-8"?>
+<p:sld xmlns:a="http://schemas.openxmlformats.org/drawingml/2006/main" xmlns:r="http://schemas.openxmlformats.org/officeDocument/2006/relationships" xmlns:p="http://schemas.openxmlformats.org/presentationml/2006/main">
+  <p:cSld>
+    <p:spTree>
+      <p:nvGrpSpPr>
+        <p:cNvPr id="1" name=""/>
+        <p:cNvGrpSpPr/>
+        <p:nvPr/>
+      </p:nvGrpSpPr>
+      <p:grpSpPr>
+        <a:xfrm>
+          <a:off x="0" y="0"/>
+          <a:ext cx="0" cy="0"/>
+          <a:chOff x="0" y="0"/>
+          <a:chExt cx="0" cy="0"/>
+        </a:xfrm>
+      </p:grpSpPr>
+      <p:sp>
+        <p:nvSpPr>
+          <p:cNvPr id="2" name="Titel 1">
+            <a:extLst>
+              <a:ext uri="{FF2B5EF4-FFF2-40B4-BE49-F238E27FC236}">
+                <a16:creationId xmlns:a16="http://schemas.microsoft.com/office/drawing/2014/main" id="{9B111F6B-8908-DC46-9EA2-7A69D3859E0C}"/>
+              </a:ext>
+            </a:extLst>
+          </p:cNvPr>
+          <p:cNvSpPr>
+            <a:spLocks noGrp="1"/>
+          </p:cNvSpPr>
+          <p:nvPr>
+            <p:ph type="title"/>
+          </p:nvPr>
+        </p:nvSpPr>
+        <p:spPr/>
+        <p:txBody>
+          <a:bodyPr/>
+          <a:lstStyle/>
+          <a:p>
+            <a:r>
+              <a:rPr lang="en-GB" dirty="0"/>
+              <a:t>Newly clustered image</a:t>
+            </a:r>
+          </a:p>
+        </p:txBody>
+      </p:sp>
+      <p:pic>
+        <p:nvPicPr>
+          <p:cNvPr id="4" name="Afbeelding 3">
+            <a:extLst>
+              <a:ext uri="{FF2B5EF4-FFF2-40B4-BE49-F238E27FC236}">
+                <a16:creationId xmlns:a16="http://schemas.microsoft.com/office/drawing/2014/main" id="{47469A24-72D4-1045-B628-594F11A5DC43}"/>
+              </a:ext>
+            </a:extLst>
+          </p:cNvPr>
+          <p:cNvPicPr>
+            <a:picLocks noChangeAspect="1"/>
+          </p:cNvPicPr>
+          <p:nvPr/>
+        </p:nvPicPr>
+        <p:blipFill>
+          <a:blip r:embed="rId2"/>
+          <a:stretch>
+            <a:fillRect/>
+          </a:stretch>
+        </p:blipFill>
+        <p:spPr>
+          <a:xfrm>
+            <a:off x="0" y="1825624"/>
+            <a:ext cx="6078406" cy="3932239"/>
+          </a:xfrm>
+          <a:prstGeom prst="rect">
+            <a:avLst/>
+          </a:prstGeom>
+        </p:spPr>
+      </p:pic>
+      <p:pic>
+        <p:nvPicPr>
+          <p:cNvPr id="5" name="Afbeelding 4">
+            <a:extLst>
+              <a:ext uri="{FF2B5EF4-FFF2-40B4-BE49-F238E27FC236}">
+                <a16:creationId xmlns:a16="http://schemas.microsoft.com/office/drawing/2014/main" id="{37DF2AE5-7EFD-1E41-8422-16C68FE1B1F2}"/>
+              </a:ext>
+            </a:extLst>
+          </p:cNvPr>
+          <p:cNvPicPr>
+            <a:picLocks noChangeAspect="1"/>
+          </p:cNvPicPr>
+          <p:nvPr/>
+        </p:nvPicPr>
+        <p:blipFill>
+          <a:blip r:embed="rId3"/>
+          <a:stretch>
+            <a:fillRect/>
+          </a:stretch>
+        </p:blipFill>
+        <p:spPr>
+          <a:xfrm>
+            <a:off x="6257925" y="1825818"/>
+            <a:ext cx="5934075" cy="3932045"/>
+          </a:xfrm>
+          <a:prstGeom prst="rect">
+            <a:avLst/>
+          </a:prstGeom>
+        </p:spPr>
+      </p:pic>
+      <p:pic>
+        <p:nvPicPr>
+          <p:cNvPr id="6" name="Afbeelding 5">
+            <a:extLst>
+              <a:ext uri="{FF2B5EF4-FFF2-40B4-BE49-F238E27FC236}">
+                <a16:creationId xmlns:a16="http://schemas.microsoft.com/office/drawing/2014/main" id="{678B0934-A4E7-F245-B1FC-8C508D560975}"/>
+              </a:ext>
+            </a:extLst>
+          </p:cNvPr>
+          <p:cNvPicPr>
+            <a:picLocks noChangeAspect="1"/>
+          </p:cNvPicPr>
+          <p:nvPr/>
+        </p:nvPicPr>
+        <p:blipFill>
+          <a:blip r:embed="rId4"/>
+          <a:stretch>
+            <a:fillRect/>
+          </a:stretch>
+        </p:blipFill>
+        <p:spPr>
+          <a:xfrm>
+            <a:off x="6257925" y="1825624"/>
+            <a:ext cx="5934075" cy="3990154"/>
+          </a:xfrm>
+          <a:prstGeom prst="rect">
+            <a:avLst/>
+          </a:prstGeom>
+        </p:spPr>
+      </p:pic>
+      <p:pic>
+        <p:nvPicPr>
+          <p:cNvPr id="7" name="Afbeelding 6">
+            <a:extLst>
+              <a:ext uri="{FF2B5EF4-FFF2-40B4-BE49-F238E27FC236}">
+                <a16:creationId xmlns:a16="http://schemas.microsoft.com/office/drawing/2014/main" id="{F65AA78F-A7AF-A145-95C9-5111463191C5}"/>
+              </a:ext>
+            </a:extLst>
+          </p:cNvPr>
+          <p:cNvPicPr>
+            <a:picLocks noChangeAspect="1"/>
+          </p:cNvPicPr>
+          <p:nvPr/>
+        </p:nvPicPr>
+        <p:blipFill>
+          <a:blip r:embed="rId5"/>
+          <a:stretch>
+            <a:fillRect/>
+          </a:stretch>
+        </p:blipFill>
+        <p:spPr>
+          <a:xfrm>
+            <a:off x="6257925" y="1825624"/>
+            <a:ext cx="5934075" cy="3990154"/>
+          </a:xfrm>
+          <a:prstGeom prst="rect">
+            <a:avLst/>
+          </a:prstGeom>
+        </p:spPr>
+      </p:pic>
+      <p:pic>
+        <p:nvPicPr>
+          <p:cNvPr id="8" name="Afbeelding 7">
+            <a:extLst>
+              <a:ext uri="{FF2B5EF4-FFF2-40B4-BE49-F238E27FC236}">
+                <a16:creationId xmlns:a16="http://schemas.microsoft.com/office/drawing/2014/main" id="{0F873C60-E83C-ED45-A171-D0F744D66BBA}"/>
+              </a:ext>
+            </a:extLst>
+          </p:cNvPr>
+          <p:cNvPicPr>
+            <a:picLocks noChangeAspect="1"/>
+          </p:cNvPicPr>
+          <p:nvPr/>
+        </p:nvPicPr>
+        <p:blipFill>
+          <a:blip r:embed="rId6"/>
+          <a:stretch>
+            <a:fillRect/>
+          </a:stretch>
+        </p:blipFill>
+        <p:spPr>
+          <a:xfrm>
+            <a:off x="6257925" y="1825623"/>
+            <a:ext cx="5934075" cy="4019857"/>
+          </a:xfrm>
+          <a:prstGeom prst="rect">
+            <a:avLst/>
+          </a:prstGeom>
+        </p:spPr>
+      </p:pic>
+    </p:spTree>
+    <p:extLst>
+      <p:ext uri="{BB962C8B-B14F-4D97-AF65-F5344CB8AC3E}">
+        <p14:creationId xmlns:p14="http://schemas.microsoft.com/office/powerpoint/2010/main" val="3453149627"/>
+      </p:ext>
+    </p:extLst>
+  </p:cSld>
+  <p:clrMapOvr>
+    <a:masterClrMapping/>
+  </p:clrMapOvr>
+  <p:timing>
+    <p:tnLst>
+      <p:par>
+        <p:cTn id="1" dur="indefinite" restart="never" nodeType="tmRoot">
+          <p:childTnLst>
+            <p:seq concurrent="1" nextAc="seek">
+              <p:cTn id="2" dur="indefinite" nodeType="mainSeq">
+                <p:childTnLst>
+                  <p:par>
+                    <p:cTn id="3" fill="hold">
+                      <p:stCondLst>
+                        <p:cond delay="indefinite"/>
+                      </p:stCondLst>
+                      <p:childTnLst>
+                        <p:par>
+                          <p:cTn id="4" fill="hold">
+                            <p:stCondLst>
+                              <p:cond delay="0"/>
+                            </p:stCondLst>
+                            <p:childTnLst>
+                              <p:par>
+                                <p:cTn id="5" presetID="1" presetClass="entr" presetSubtype="0" fill="hold" nodeType="clickEffect">
+                                  <p:stCondLst>
+                                    <p:cond delay="0"/>
+                                  </p:stCondLst>
+                                  <p:childTnLst>
+                                    <p:set>
+                                      <p:cBhvr>
+                                        <p:cTn id="6" dur="1" fill="hold">
+                                          <p:stCondLst>
+                                            <p:cond delay="0"/>
+                                          </p:stCondLst>
+                                        </p:cTn>
+                                        <p:tgtEl>
+                                          <p:spTgt spid="5"/>
+                                        </p:tgtEl>
+                                        <p:attrNameLst>
+                                          <p:attrName>style.visibility</p:attrName>
+                                        </p:attrNameLst>
+                                      </p:cBhvr>
+                                      <p:to>
+                                        <p:strVal val="visible"/>
+                                      </p:to>
+                                    </p:set>
+                                  </p:childTnLst>
+                                </p:cTn>
+                              </p:par>
+                            </p:childTnLst>
+                          </p:cTn>
+                        </p:par>
+                      </p:childTnLst>
+                    </p:cTn>
+                  </p:par>
+                  <p:par>
+                    <p:cTn id="7" fill="hold">
+                      <p:stCondLst>
+                        <p:cond delay="indefinite"/>
+                      </p:stCondLst>
+                      <p:childTnLst>
+                        <p:par>
+                          <p:cTn id="8" fill="hold">
+                            <p:stCondLst>
+                              <p:cond delay="0"/>
+                            </p:stCondLst>
+                            <p:childTnLst>
+                              <p:par>
+                                <p:cTn id="9" presetID="1" presetClass="entr" presetSubtype="0" fill="hold" nodeType="clickEffect">
+                                  <p:stCondLst>
+                                    <p:cond delay="0"/>
+                                  </p:stCondLst>
+                                  <p:childTnLst>
+                                    <p:set>
+                                      <p:cBhvr>
+                                        <p:cTn id="10" dur="1" fill="hold">
+                                          <p:stCondLst>
+                                            <p:cond delay="0"/>
+                                          </p:stCondLst>
+                                        </p:cTn>
+                                        <p:tgtEl>
+                                          <p:spTgt spid="6"/>
+                                        </p:tgtEl>
+                                        <p:attrNameLst>
+                                          <p:attrName>style.visibility</p:attrName>
+                                        </p:attrNameLst>
+                                      </p:cBhvr>
+                                      <p:to>
+                                        <p:strVal val="visible"/>
+                                      </p:to>
+                                    </p:set>
+                                  </p:childTnLst>
+                                </p:cTn>
+                              </p:par>
+                            </p:childTnLst>
+                          </p:cTn>
+                        </p:par>
+                      </p:childTnLst>
+                    </p:cTn>
+                  </p:par>
+                  <p:par>
+                    <p:cTn id="11" fill="hold">
+                      <p:stCondLst>
+                        <p:cond delay="indefinite"/>
+                      </p:stCondLst>
+                      <p:childTnLst>
+                        <p:par>
+                          <p:cTn id="12" fill="hold">
+                            <p:stCondLst>
+                              <p:cond delay="0"/>
+                            </p:stCondLst>
+                            <p:childTnLst>
+                              <p:par>
+                                <p:cTn id="13" presetID="1" presetClass="entr" presetSubtype="0" fill="hold" nodeType="clickEffect">
+                                  <p:stCondLst>
+                                    <p:cond delay="0"/>
+                                  </p:stCondLst>
+                                  <p:childTnLst>
+                                    <p:set>
+                                      <p:cBhvr>
+                                        <p:cTn id="14" dur="1" fill="hold">
+                                          <p:stCondLst>
+                                            <p:cond delay="0"/>
+                                          </p:stCondLst>
+                                        </p:cTn>
+                                        <p:tgtEl>
+                                          <p:spTgt spid="7"/>
+                                        </p:tgtEl>
+                                        <p:attrNameLst>
+                                          <p:attrName>style.visibility</p:attrName>
+                                        </p:attrNameLst>
+                                      </p:cBhvr>
+                                      <p:to>
+                                        <p:strVal val="visible"/>
+                                      </p:to>
+                                    </p:set>
+                                  </p:childTnLst>
+                                </p:cTn>
+                              </p:par>
+                            </p:childTnLst>
+                          </p:cTn>
+                        </p:par>
+                      </p:childTnLst>
+                    </p:cTn>
+                  </p:par>
+                  <p:par>
+                    <p:cTn id="15" fill="hold">
+                      <p:stCondLst>
+                        <p:cond delay="indefinite"/>
+                      </p:stCondLst>
+                      <p:childTnLst>
+                        <p:par>
+                          <p:cTn id="16" fill="hold">
+                            <p:stCondLst>
+                              <p:cond delay="0"/>
+                            </p:stCondLst>
+                            <p:childTnLst>
+                              <p:par>
+                                <p:cTn id="17" presetID="1" presetClass="entr" presetSubtype="0" fill="hold" nodeType="clickEffect">
+                                  <p:stCondLst>
+                                    <p:cond delay="0"/>
+                                  </p:stCondLst>
+                                  <p:childTnLst>
+                                    <p:set>
+                                      <p:cBhvr>
+                                        <p:cTn id="18" dur="1" fill="hold">
+                                          <p:stCondLst>
+                                            <p:cond delay="0"/>
+                                          </p:stCondLst>
+                                        </p:cTn>
+                                        <p:tgtEl>
+                                          <p:spTgt spid="8"/>
                                         </p:tgtEl>
                                         <p:attrNameLst>
                                           <p:attrName>style.visibility</p:attrName>

</xml_diff>